<commit_message>
Aggiornato PPTX Corso Info
</commit_message>
<xml_diff>
--- a/CorsoCRI/Modulo_01_Lezione_01_Informatica.pptx
+++ b/CorsoCRI/Modulo_01_Lezione_01_Informatica.pptx
@@ -292,7 +292,7 @@
           <a:p>
             <a:fld id="{F222934C-0A64-4E96-BF9C-6B5E1ACA4326}" type="datetimeFigureOut">
               <a:rPr lang="it-IT" smtClean="0"/>
-              <a:t>04/11/2024</a:t>
+              <a:t>17/05/2025</a:t>
             </a:fld>
             <a:endParaRPr lang="it-IT"/>
           </a:p>
@@ -1294,7 +1294,7 @@
           <a:p>
             <a:fld id="{5BCAD085-E8A6-8845-BD4E-CB4CCA059FC4}" type="datetimeFigureOut">
               <a:rPr lang="en-US" smtClean="0"/>
-              <a:t>11/4/2024</a:t>
+              <a:t>5/17/2025</a:t>
             </a:fld>
             <a:endParaRPr lang="en-US"/>
           </a:p>
@@ -1462,7 +1462,7 @@
           <a:p>
             <a:fld id="{5BCAD085-E8A6-8845-BD4E-CB4CCA059FC4}" type="datetimeFigureOut">
               <a:rPr lang="en-US" smtClean="0"/>
-              <a:t>11/4/2024</a:t>
+              <a:t>5/17/2025</a:t>
             </a:fld>
             <a:endParaRPr lang="en-US"/>
           </a:p>
@@ -1640,7 +1640,7 @@
           <a:p>
             <a:fld id="{5BCAD085-E8A6-8845-BD4E-CB4CCA059FC4}" type="datetimeFigureOut">
               <a:rPr lang="en-US" smtClean="0"/>
-              <a:t>11/4/2024</a:t>
+              <a:t>5/17/2025</a:t>
             </a:fld>
             <a:endParaRPr lang="en-US"/>
           </a:p>
@@ -1808,7 +1808,7 @@
           <a:p>
             <a:fld id="{5BCAD085-E8A6-8845-BD4E-CB4CCA059FC4}" type="datetimeFigureOut">
               <a:rPr lang="en-US" smtClean="0"/>
-              <a:t>11/4/2024</a:t>
+              <a:t>5/17/2025</a:t>
             </a:fld>
             <a:endParaRPr lang="en-US"/>
           </a:p>
@@ -2053,7 +2053,7 @@
           <a:p>
             <a:fld id="{5BCAD085-E8A6-8845-BD4E-CB4CCA059FC4}" type="datetimeFigureOut">
               <a:rPr lang="en-US" smtClean="0"/>
-              <a:t>11/4/2024</a:t>
+              <a:t>5/17/2025</a:t>
             </a:fld>
             <a:endParaRPr lang="en-US"/>
           </a:p>
@@ -2338,7 +2338,7 @@
           <a:p>
             <a:fld id="{5BCAD085-E8A6-8845-BD4E-CB4CCA059FC4}" type="datetimeFigureOut">
               <a:rPr lang="en-US" smtClean="0"/>
-              <a:t>11/4/2024</a:t>
+              <a:t>5/17/2025</a:t>
             </a:fld>
             <a:endParaRPr lang="en-US"/>
           </a:p>
@@ -2757,7 +2757,7 @@
           <a:p>
             <a:fld id="{5BCAD085-E8A6-8845-BD4E-CB4CCA059FC4}" type="datetimeFigureOut">
               <a:rPr lang="en-US" smtClean="0"/>
-              <a:t>11/4/2024</a:t>
+              <a:t>5/17/2025</a:t>
             </a:fld>
             <a:endParaRPr lang="en-US"/>
           </a:p>
@@ -2874,7 +2874,7 @@
           <a:p>
             <a:fld id="{5BCAD085-E8A6-8845-BD4E-CB4CCA059FC4}" type="datetimeFigureOut">
               <a:rPr lang="en-US" smtClean="0"/>
-              <a:t>11/4/2024</a:t>
+              <a:t>5/17/2025</a:t>
             </a:fld>
             <a:endParaRPr lang="en-US"/>
           </a:p>
@@ -2969,7 +2969,7 @@
           <a:p>
             <a:fld id="{5BCAD085-E8A6-8845-BD4E-CB4CCA059FC4}" type="datetimeFigureOut">
               <a:rPr lang="en-US" smtClean="0"/>
-              <a:t>11/4/2024</a:t>
+              <a:t>5/17/2025</a:t>
             </a:fld>
             <a:endParaRPr lang="en-US"/>
           </a:p>
@@ -3244,7 +3244,7 @@
           <a:p>
             <a:fld id="{5BCAD085-E8A6-8845-BD4E-CB4CCA059FC4}" type="datetimeFigureOut">
               <a:rPr lang="en-US" smtClean="0"/>
-              <a:t>11/4/2024</a:t>
+              <a:t>5/17/2025</a:t>
             </a:fld>
             <a:endParaRPr lang="en-US"/>
           </a:p>
@@ -3496,7 +3496,7 @@
           <a:p>
             <a:fld id="{5BCAD085-E8A6-8845-BD4E-CB4CCA059FC4}" type="datetimeFigureOut">
               <a:rPr lang="en-US" smtClean="0"/>
-              <a:t>11/4/2024</a:t>
+              <a:t>5/17/2025</a:t>
             </a:fld>
             <a:endParaRPr lang="en-US"/>
           </a:p>
@@ -3591,8 +3591,8 @@
         </p:nvSpPr>
         <p:spPr>
           <a:xfrm>
-            <a:off x="609600" y="274638"/>
-            <a:ext cx="10972800" cy="1143000"/>
+            <a:off x="0" y="-1587"/>
+            <a:ext cx="12192000" cy="1143000"/>
           </a:xfrm>
           <a:prstGeom prst="rect">
             <a:avLst/>
@@ -3707,7 +3707,7 @@
           <a:p>
             <a:fld id="{5BCAD085-E8A6-8845-BD4E-CB4CCA059FC4}" type="datetimeFigureOut">
               <a:rPr lang="en-US" smtClean="0"/>
-              <a:t>11/4/2024</a:t>
+              <a:t>5/17/2025</a:t>
             </a:fld>
             <a:endParaRPr lang="en-US"/>
           </a:p>
@@ -4094,7 +4094,7 @@
         </p:nvSpPr>
         <p:spPr>
           <a:xfrm>
-            <a:off x="0" y="274638"/>
+            <a:off x="0" y="318"/>
             <a:ext cx="12192000" cy="1143000"/>
           </a:xfrm>
         </p:spPr>
@@ -4949,15 +4949,15 @@
           <a:lstStyle/>
           <a:p>
             <a:r>
-              <a:rPr lang="it-IT" spc="-35" dirty="0"/>
+              <a:rPr lang="it-IT" b="1" spc="-35" dirty="0"/>
               <a:t>CAPITOLO</a:t>
             </a:r>
             <a:r>
-              <a:rPr lang="it-IT" spc="-30" dirty="0"/>
+              <a:rPr lang="it-IT" b="1" spc="-30" dirty="0"/>
               <a:t> </a:t>
             </a:r>
             <a:r>
-              <a:rPr lang="it-IT" dirty="0"/>
+              <a:rPr lang="it-IT" b="1" dirty="0"/>
               <a:t>1</a:t>
             </a:r>
             <a:br>
@@ -5036,33 +5036,6 @@
       </p:grpSpPr>
       <p:sp>
         <p:nvSpPr>
-          <p:cNvPr id="2" name="Title 1"/>
-          <p:cNvSpPr>
-            <a:spLocks noGrp="1"/>
-          </p:cNvSpPr>
-          <p:nvPr>
-            <p:ph type="title"/>
-          </p:nvPr>
-        </p:nvSpPr>
-        <p:spPr>
-          <a:xfrm>
-            <a:off x="0" y="274638"/>
-            <a:ext cx="12192000" cy="1143000"/>
-          </a:xfrm>
-        </p:spPr>
-        <p:txBody>
-          <a:bodyPr/>
-          <a:lstStyle/>
-          <a:p>
-            <a:r>
-              <a:rPr lang="it-IT" dirty="0"/>
-              <a:t>Cos'è l'informatica?</a:t>
-            </a:r>
-          </a:p>
-        </p:txBody>
-      </p:sp>
-      <p:sp>
-        <p:nvSpPr>
           <p:cNvPr id="3" name="Content Placeholder 2"/>
           <p:cNvSpPr>
             <a:spLocks noGrp="1"/>
@@ -5172,6 +5145,34 @@
             <a:r>
               <a:rPr lang="it-IT" sz="2800" dirty="0"/>
               <a:t>L’informatica è una scienza relativamente recente e tuttavia complessa e  articolata e soprattutto trasversale a moltissime discipline ed impararne i fondamenti è ormai fondamentale.</a:t>
+            </a:r>
+          </a:p>
+        </p:txBody>
+      </p:sp>
+      <p:sp>
+        <p:nvSpPr>
+          <p:cNvPr id="5" name="Titolo 4">
+            <a:extLst>
+              <a:ext uri="{FF2B5EF4-FFF2-40B4-BE49-F238E27FC236}">
+                <a16:creationId xmlns:a16="http://schemas.microsoft.com/office/drawing/2014/main" id="{1EDF830B-F879-8D5F-FFF7-E58BABD649DC}"/>
+              </a:ext>
+            </a:extLst>
+          </p:cNvPr>
+          <p:cNvSpPr>
+            <a:spLocks noGrp="1"/>
+          </p:cNvSpPr>
+          <p:nvPr>
+            <p:ph type="title"/>
+          </p:nvPr>
+        </p:nvSpPr>
+        <p:spPr/>
+        <p:txBody>
+          <a:bodyPr/>
+          <a:lstStyle/>
+          <a:p>
+            <a:r>
+              <a:rPr lang="it-IT" dirty="0"/>
+              <a:t>Cos'è l'informatica?</a:t>
             </a:r>
           </a:p>
         </p:txBody>
@@ -5209,10 +5210,10 @@
       </p:grpSpPr>
       <p:sp>
         <p:nvSpPr>
-          <p:cNvPr id="2" name="Title 1">
+          <p:cNvPr id="5" name="Titolo 4">
             <a:extLst>
               <a:ext uri="{FF2B5EF4-FFF2-40B4-BE49-F238E27FC236}">
-                <a16:creationId xmlns:a16="http://schemas.microsoft.com/office/drawing/2014/main" id="{10C33A7A-BD88-1A37-DE26-D48526709AE4}"/>
+                <a16:creationId xmlns:a16="http://schemas.microsoft.com/office/drawing/2014/main" id="{CECA4B89-A235-9E88-3E08-138ECF0203A1}"/>
               </a:ext>
             </a:extLst>
           </p:cNvPr>
@@ -5223,12 +5224,7 @@
             <p:ph type="title"/>
           </p:nvPr>
         </p:nvSpPr>
-        <p:spPr>
-          <a:xfrm>
-            <a:off x="0" y="274638"/>
-            <a:ext cx="12192000" cy="1143000"/>
-          </a:xfrm>
-        </p:spPr>
+        <p:spPr/>
         <p:txBody>
           <a:bodyPr/>
           <a:lstStyle/>
@@ -5258,8 +5254,8 @@
         </p:nvSpPr>
         <p:spPr>
           <a:xfrm>
-            <a:off x="609600" y="1203961"/>
-            <a:ext cx="10972800" cy="5572759"/>
+            <a:off x="609600" y="1141413"/>
+            <a:ext cx="10972800" cy="4984751"/>
           </a:xfrm>
         </p:spPr>
         <p:txBody>
@@ -5447,12 +5443,7 @@
             <p:ph type="title"/>
           </p:nvPr>
         </p:nvSpPr>
-        <p:spPr>
-          <a:xfrm>
-            <a:off x="0" y="274638"/>
-            <a:ext cx="12192000" cy="1143000"/>
-          </a:xfrm>
-        </p:spPr>
+        <p:spPr/>
         <p:txBody>
           <a:bodyPr/>
           <a:lstStyle/>
@@ -6346,34 +6337,6 @@
       </p:grpSpPr>
       <p:sp>
         <p:nvSpPr>
-          <p:cNvPr id="2" name="Titolo 1">
-            <a:extLst>
-              <a:ext uri="{FF2B5EF4-FFF2-40B4-BE49-F238E27FC236}">
-                <a16:creationId xmlns:a16="http://schemas.microsoft.com/office/drawing/2014/main" id="{F2BE1A43-12DF-B758-1B5C-2C6700002F9F}"/>
-              </a:ext>
-            </a:extLst>
-          </p:cNvPr>
-          <p:cNvSpPr>
-            <a:spLocks noGrp="1"/>
-          </p:cNvSpPr>
-          <p:nvPr>
-            <p:ph type="title"/>
-          </p:nvPr>
-        </p:nvSpPr>
-        <p:spPr/>
-        <p:txBody>
-          <a:bodyPr/>
-          <a:lstStyle/>
-          <a:p>
-            <a:r>
-              <a:rPr lang="it-IT" dirty="0"/>
-              <a:t>Agenda</a:t>
-            </a:r>
-          </a:p>
-        </p:txBody>
-      </p:sp>
-      <p:sp>
-        <p:nvSpPr>
           <p:cNvPr id="3" name="Segnaposto contenuto 2">
             <a:extLst>
               <a:ext uri="{FF2B5EF4-FFF2-40B4-BE49-F238E27FC236}">
@@ -6395,15 +6358,6 @@
           </a:bodyPr>
           <a:lstStyle/>
           <a:p>
-            <a:pPr marL="0" indent="0">
-              <a:buNone/>
-            </a:pPr>
-            <a:r>
-              <a:rPr lang="it-IT" dirty="0"/>
-              <a:t>Lezione 01: Informatica: cos'è, storia e prospettive</a:t>
-            </a:r>
-          </a:p>
-          <a:p>
             <a:pPr marL="514350" indent="-514350">
               <a:buAutoNum type="arabicPeriod"/>
             </a:pPr>
@@ -6430,6 +6384,36 @@
             <a:r>
               <a:rPr lang="it-IT" dirty="0"/>
               <a:t>Principali aree dell'informatica (hardware, software, reti, intelligenza artificiale, ecc.)</a:t>
+            </a:r>
+          </a:p>
+        </p:txBody>
+      </p:sp>
+      <p:sp>
+        <p:nvSpPr>
+          <p:cNvPr id="5" name="Titolo 4">
+            <a:extLst>
+              <a:ext uri="{FF2B5EF4-FFF2-40B4-BE49-F238E27FC236}">
+                <a16:creationId xmlns:a16="http://schemas.microsoft.com/office/drawing/2014/main" id="{C2C0AA5E-11DD-D148-A58C-FE8536A6AC56}"/>
+              </a:ext>
+            </a:extLst>
+          </p:cNvPr>
+          <p:cNvSpPr>
+            <a:spLocks noGrp="1"/>
+          </p:cNvSpPr>
+          <p:nvPr>
+            <p:ph type="title"/>
+          </p:nvPr>
+        </p:nvSpPr>
+        <p:spPr/>
+        <p:txBody>
+          <a:bodyPr>
+            <a:normAutofit/>
+          </a:bodyPr>
+          <a:lstStyle/>
+          <a:p>
+            <a:r>
+              <a:rPr lang="it-IT" dirty="0"/>
+              <a:t>Agenda - Informatica: cos'è, storia e prospettive</a:t>
             </a:r>
           </a:p>
         </p:txBody>
@@ -8255,7 +8239,7 @@
               <a:buNone/>
             </a:pPr>
             <a:r>
-              <a:rPr lang="it-IT" sz="2800" dirty="0"/>
+              <a:rPr lang="it-IT" sz="2800" b="1" dirty="0"/>
               <a:t>Hardware (HW): </a:t>
             </a:r>
             <a:r>
@@ -8288,7 +8272,7 @@
               <a:buNone/>
             </a:pPr>
             <a:r>
-              <a:rPr lang="it-IT" sz="2800" dirty="0"/>
+              <a:rPr lang="it-IT" sz="2800" b="1" dirty="0"/>
               <a:t>Software (SW): </a:t>
             </a:r>
             <a:r>
@@ -8637,9 +8621,6 @@
             </a:pPr>
             <a:r>
               <a:rPr lang="it-IT" sz="2800" dirty="0">
-                <a:solidFill>
-                  <a:srgbClr val="A50021"/>
-                </a:solidFill>
                 <a:latin typeface="Arial MT"/>
                 <a:cs typeface="Arial MT"/>
               </a:rPr>
@@ -8647,9 +8628,6 @@
             </a:r>
             <a:r>
               <a:rPr lang="it-IT" sz="2800" spc="-30" dirty="0">
-                <a:solidFill>
-                  <a:srgbClr val="A50021"/>
-                </a:solidFill>
                 <a:latin typeface="Arial MT"/>
                 <a:cs typeface="Arial MT"/>
               </a:rPr>
@@ -8657,9 +8635,6 @@
             </a:r>
             <a:r>
               <a:rPr lang="it-IT" sz="2800" spc="-5" dirty="0">
-                <a:solidFill>
-                  <a:srgbClr val="A50021"/>
-                </a:solidFill>
                 <a:latin typeface="Arial MT"/>
                 <a:cs typeface="Arial MT"/>
               </a:rPr>
@@ -9436,12 +9411,7 @@
             <p:ph type="title"/>
           </p:nvPr>
         </p:nvSpPr>
-        <p:spPr>
-          <a:xfrm>
-            <a:off x="0" y="274638"/>
-            <a:ext cx="12192000" cy="1143000"/>
-          </a:xfrm>
-        </p:spPr>
+        <p:spPr/>
         <p:txBody>
           <a:bodyPr/>
           <a:lstStyle/>
@@ -9468,15 +9438,10 @@
             <a:spLocks noGrp="1"/>
           </p:cNvSpPr>
           <p:nvPr>
-            <p:ph idx="1"/>
-          </p:nvPr>
-        </p:nvSpPr>
-        <p:spPr>
-          <a:xfrm>
-            <a:off x="609600" y="1600201"/>
-            <a:ext cx="6328126" cy="3103879"/>
-          </a:xfrm>
-        </p:spPr>
+            <p:ph sz="half" idx="1"/>
+          </p:nvPr>
+        </p:nvSpPr>
+        <p:spPr/>
         <p:txBody>
           <a:bodyPr>
             <a:normAutofit/>
@@ -9491,6 +9456,34 @@
               <a:t>La pascalina (in francese pascaline) è uno strumento di calcolo precursore della moderna calcolatrice. Fu inventata nel 1642 dal matematico e filosofo francese Blaise Pascal, da cui prese il nome.</a:t>
             </a:r>
             <a:endParaRPr dirty="0"/>
+          </a:p>
+        </p:txBody>
+      </p:sp>
+      <p:sp>
+        <p:nvSpPr>
+          <p:cNvPr id="4" name="Segnaposto contenuto 3">
+            <a:extLst>
+              <a:ext uri="{FF2B5EF4-FFF2-40B4-BE49-F238E27FC236}">
+                <a16:creationId xmlns:a16="http://schemas.microsoft.com/office/drawing/2014/main" id="{FD8B4D26-37CA-828B-A331-2B0C20B7F9D4}"/>
+              </a:ext>
+            </a:extLst>
+          </p:cNvPr>
+          <p:cNvSpPr>
+            <a:spLocks noGrp="1"/>
+          </p:cNvSpPr>
+          <p:nvPr>
+            <p:ph sz="half" idx="2"/>
+          </p:nvPr>
+        </p:nvSpPr>
+        <p:spPr/>
+        <p:txBody>
+          <a:bodyPr/>
+          <a:lstStyle/>
+          <a:p>
+            <a:pPr marL="0" indent="0">
+              <a:buNone/>
+            </a:pPr>
+            <a:endParaRPr lang="it-IT" dirty="0"/>
           </a:p>
         </p:txBody>
       </p:sp>
@@ -9523,7 +9516,7 @@
         </p:blipFill>
         <p:spPr bwMode="auto">
           <a:xfrm>
-            <a:off x="7161246" y="1727200"/>
+            <a:off x="6785326" y="1620461"/>
             <a:ext cx="4797074" cy="2631122"/>
           </a:xfrm>
           <a:prstGeom prst="rect">
@@ -9630,7 +9623,7 @@
           <a:p>
             <a:r>
               <a:rPr lang="it-IT" dirty="0"/>
-              <a:t>Agenda</a:t>
+              <a:t>Agenda - Informatica: cos'è, storia e prospettive</a:t>
             </a:r>
           </a:p>
         </p:txBody>
@@ -9659,18 +9652,9 @@
         </p:spPr>
         <p:txBody>
           <a:bodyPr>
-            <a:normAutofit fontScale="77500" lnSpcReduction="20000"/>
+            <a:normAutofit fontScale="85000" lnSpcReduction="20000"/>
           </a:bodyPr>
           <a:lstStyle/>
-          <a:p>
-            <a:pPr marL="0" indent="0">
-              <a:buNone/>
-            </a:pPr>
-            <a:r>
-              <a:rPr lang="it-IT" dirty="0"/>
-              <a:t>Lezione 01: Informatica: cos'è, storia e prospettive</a:t>
-            </a:r>
-          </a:p>
           <a:p>
             <a:pPr marL="0" indent="0">
               <a:buNone/>
@@ -9809,12 +9793,7 @@
             <p:ph type="title"/>
           </p:nvPr>
         </p:nvSpPr>
-        <p:spPr>
-          <a:xfrm>
-            <a:off x="0" y="274638"/>
-            <a:ext cx="12192000" cy="1143000"/>
-          </a:xfrm>
-        </p:spPr>
+        <p:spPr/>
         <p:txBody>
           <a:bodyPr/>
           <a:lstStyle/>
@@ -9979,12 +9958,7 @@
             <p:ph type="title"/>
           </p:nvPr>
         </p:nvSpPr>
-        <p:spPr>
-          <a:xfrm>
-            <a:off x="0" y="274638"/>
-            <a:ext cx="12192000" cy="1143000"/>
-          </a:xfrm>
-        </p:spPr>
+        <p:spPr/>
         <p:txBody>
           <a:bodyPr/>
           <a:lstStyle/>
@@ -10097,12 +10071,7 @@
             <p:ph type="title"/>
           </p:nvPr>
         </p:nvSpPr>
-        <p:spPr>
-          <a:xfrm>
-            <a:off x="0" y="274638"/>
-            <a:ext cx="12192000" cy="1143000"/>
-          </a:xfrm>
-        </p:spPr>
+        <p:spPr/>
         <p:txBody>
           <a:bodyPr/>
           <a:lstStyle/>
@@ -10132,8 +10101,8 @@
         </p:nvSpPr>
         <p:spPr>
           <a:xfrm>
-            <a:off x="609600" y="2194560"/>
-            <a:ext cx="10972800" cy="4073842"/>
+            <a:off x="609600" y="1981200"/>
+            <a:ext cx="10972800" cy="4144964"/>
           </a:xfrm>
         </p:spPr>
         <p:txBody>
@@ -10213,7 +10182,7 @@
         <p:spPr>
           <a:xfrm>
             <a:off x="609600" y="2052447"/>
-            <a:ext cx="8220140" cy="1569660"/>
+            <a:ext cx="8331200" cy="1569660"/>
           </a:xfrm>
           <a:prstGeom prst="rect">
             <a:avLst/>
@@ -11256,8 +11225,8 @@
         </p:blipFill>
         <p:spPr>
           <a:xfrm>
-            <a:off x="9085153" y="4375595"/>
-            <a:ext cx="1694687" cy="2090927"/>
+            <a:off x="9156273" y="3877754"/>
+            <a:ext cx="2275486" cy="2807525"/>
           </a:xfrm>
           <a:prstGeom prst="rect">
             <a:avLst/>
@@ -11563,7 +11532,7 @@
           <a:p>
             <a:r>
               <a:rPr lang="it-IT" dirty="0"/>
-              <a:t>Agenda</a:t>
+              <a:t>Agenda - Informatica: cos'è, storia e prospettive</a:t>
             </a:r>
           </a:p>
         </p:txBody>
@@ -11592,18 +11561,9 @@
         </p:spPr>
         <p:txBody>
           <a:bodyPr>
-            <a:normAutofit fontScale="92500" lnSpcReduction="10000"/>
+            <a:normAutofit lnSpcReduction="10000"/>
           </a:bodyPr>
           <a:lstStyle/>
-          <a:p>
-            <a:pPr marL="0" indent="0">
-              <a:buNone/>
-            </a:pPr>
-            <a:r>
-              <a:rPr lang="it-IT" dirty="0"/>
-              <a:t>Lezione 01: Informatica: cos'è, storia e prospettive</a:t>
-            </a:r>
-          </a:p>
           <a:p>
             <a:pPr marL="0" indent="0">
               <a:buNone/>
@@ -11727,12 +11687,7 @@
             <p:ph type="title"/>
           </p:nvPr>
         </p:nvSpPr>
-        <p:spPr>
-          <a:xfrm>
-            <a:off x="-1" y="274638"/>
-            <a:ext cx="12184033" cy="1143000"/>
-          </a:xfrm>
-        </p:spPr>
+        <p:spPr/>
         <p:txBody>
           <a:bodyPr/>
           <a:lstStyle/>
@@ -11761,15 +11716,10 @@
             <p:ph idx="1"/>
           </p:nvPr>
         </p:nvSpPr>
-        <p:spPr>
-          <a:xfrm>
-            <a:off x="609600" y="1503680"/>
-            <a:ext cx="10972800" cy="5181600"/>
-          </a:xfrm>
-        </p:spPr>
+        <p:spPr/>
         <p:txBody>
           <a:bodyPr>
-            <a:normAutofit/>
+            <a:normAutofit lnSpcReduction="10000"/>
           </a:bodyPr>
           <a:lstStyle/>
           <a:p>
@@ -11836,12 +11786,7 @@
             <p:ph type="title"/>
           </p:nvPr>
         </p:nvSpPr>
-        <p:spPr>
-          <a:xfrm>
-            <a:off x="-1" y="274638"/>
-            <a:ext cx="12184033" cy="1143000"/>
-          </a:xfrm>
-        </p:spPr>
+        <p:spPr/>
         <p:txBody>
           <a:bodyPr/>
           <a:lstStyle/>
@@ -11870,15 +11815,10 @@
             <p:ph idx="1"/>
           </p:nvPr>
         </p:nvSpPr>
-        <p:spPr>
-          <a:xfrm>
-            <a:off x="609600" y="1503680"/>
-            <a:ext cx="10972800" cy="5181600"/>
-          </a:xfrm>
-        </p:spPr>
+        <p:spPr/>
         <p:txBody>
           <a:bodyPr>
-            <a:normAutofit/>
+            <a:normAutofit fontScale="92500" lnSpcReduction="10000"/>
           </a:bodyPr>
           <a:lstStyle/>
           <a:p>
@@ -11970,12 +11910,7 @@
             <p:ph type="title"/>
           </p:nvPr>
         </p:nvSpPr>
-        <p:spPr>
-          <a:xfrm>
-            <a:off x="-1" y="274638"/>
-            <a:ext cx="12184033" cy="1143000"/>
-          </a:xfrm>
-        </p:spPr>
+        <p:spPr/>
         <p:txBody>
           <a:bodyPr/>
           <a:lstStyle/>
@@ -12004,12 +11939,7 @@
             <p:ph idx="1"/>
           </p:nvPr>
         </p:nvSpPr>
-        <p:spPr>
-          <a:xfrm>
-            <a:off x="609600" y="1503680"/>
-            <a:ext cx="10972800" cy="5181600"/>
-          </a:xfrm>
-        </p:spPr>
+        <p:spPr/>
         <p:txBody>
           <a:bodyPr>
             <a:normAutofit/>
@@ -12247,8 +12177,18 @@
           <a:lstStyle/>
           <a:p>
             <a:r>
-              <a:t>Linguaggi di programmazione</a:t>
-            </a:r>
+              <a:rPr dirty="0" err="1"/>
+              <a:t>Linguaggi</a:t>
+            </a:r>
+            <a:r>
+              <a:rPr dirty="0"/>
+              <a:t> di </a:t>
+            </a:r>
+            <a:r>
+              <a:rPr dirty="0" err="1"/>
+              <a:t>programmazione</a:t>
+            </a:r>
+            <a:endParaRPr dirty="0"/>
           </a:p>
         </p:txBody>
       </p:sp>
@@ -12314,8 +12254,22 @@
           <a:lstStyle/>
           <a:p>
             <a:r>
-              <a:t>Informatica nella guerra</a:t>
-            </a:r>
+              <a:rPr dirty="0"/>
+              <a:t>Informatica </a:t>
+            </a:r>
+            <a:r>
+              <a:rPr dirty="0" err="1"/>
+              <a:t>nella</a:t>
+            </a:r>
+            <a:r>
+              <a:rPr dirty="0"/>
+              <a:t> </a:t>
+            </a:r>
+            <a:r>
+              <a:rPr dirty="0" err="1"/>
+              <a:t>guerra</a:t>
+            </a:r>
+            <a:endParaRPr dirty="0"/>
           </a:p>
         </p:txBody>
       </p:sp>
@@ -12335,7 +12289,52 @@
           <a:lstStyle/>
           <a:p>
             <a:r>
-              <a:t>Utilizzo dell'informatica nella seconda guerra mondiale.</a:t>
+              <a:rPr dirty="0" err="1"/>
+              <a:t>Utilizzo</a:t>
+            </a:r>
+            <a:r>
+              <a:rPr dirty="0"/>
+              <a:t> </a:t>
+            </a:r>
+            <a:r>
+              <a:rPr dirty="0" err="1"/>
+              <a:t>dell'informatica</a:t>
+            </a:r>
+            <a:r>
+              <a:rPr dirty="0"/>
+              <a:t> </a:t>
+            </a:r>
+            <a:r>
+              <a:rPr dirty="0" err="1"/>
+              <a:t>nella</a:t>
+            </a:r>
+            <a:r>
+              <a:rPr dirty="0"/>
+              <a:t> </a:t>
+            </a:r>
+            <a:r>
+              <a:rPr dirty="0" err="1"/>
+              <a:t>seconda</a:t>
+            </a:r>
+            <a:r>
+              <a:rPr dirty="0"/>
+              <a:t> </a:t>
+            </a:r>
+            <a:r>
+              <a:rPr dirty="0" err="1"/>
+              <a:t>guerra</a:t>
+            </a:r>
+            <a:r>
+              <a:rPr dirty="0"/>
+              <a:t> </a:t>
+            </a:r>
+            <a:r>
+              <a:rPr dirty="0" err="1"/>
+              <a:t>mondiale</a:t>
+            </a:r>
+            <a:r>
+              <a:rPr dirty="0"/>
+              <a:t>.</a:t>
             </a:r>
           </a:p>
         </p:txBody>
@@ -12671,7 +12670,7 @@
           <a:p>
             <a:r>
               <a:rPr lang="it-IT" dirty="0"/>
-              <a:t>Agenda</a:t>
+              <a:t>Agenda - Informatica: cos'è, storia e prospettive</a:t>
             </a:r>
           </a:p>
         </p:txBody>
@@ -12703,15 +12702,6 @@
             <a:normAutofit/>
           </a:bodyPr>
           <a:lstStyle/>
-          <a:p>
-            <a:pPr marL="0" indent="0">
-              <a:buNone/>
-            </a:pPr>
-            <a:r>
-              <a:rPr lang="it-IT" dirty="0"/>
-              <a:t>Lezione 01: Informatica: cos'è, storia e prospettive</a:t>
-            </a:r>
-          </a:p>
           <a:p>
             <a:pPr marL="0" indent="0">
               <a:buNone/>
@@ -13475,7 +13465,7 @@
           <a:p>
             <a:r>
               <a:rPr lang="it-IT" dirty="0"/>
-              <a:t>Agenda</a:t>
+              <a:t>Agenda - Informatica: cos'è, storia e prospettive</a:t>
             </a:r>
           </a:p>
         </p:txBody>
@@ -13504,18 +13494,9 @@
         </p:spPr>
         <p:txBody>
           <a:bodyPr>
-            <a:normAutofit fontScale="77500" lnSpcReduction="20000"/>
+            <a:normAutofit fontScale="85000" lnSpcReduction="20000"/>
           </a:bodyPr>
           <a:lstStyle/>
-          <a:p>
-            <a:pPr marL="0" indent="0">
-              <a:buNone/>
-            </a:pPr>
-            <a:r>
-              <a:rPr lang="it-IT" dirty="0"/>
-              <a:t>Lezione 01: Informatica: cos'è, storia e prospettive</a:t>
-            </a:r>
-          </a:p>
           <a:p>
             <a:pPr marL="0" indent="0">
               <a:buNone/>
@@ -13653,8 +13634,26 @@
           <a:lstStyle/>
           <a:p>
             <a:r>
-              <a:t>Innovazioni nei videogiochi</a:t>
-            </a:r>
+              <a:rPr dirty="0" err="1"/>
+              <a:t>Innovazioni</a:t>
+            </a:r>
+            <a:r>
+              <a:rPr dirty="0"/>
+              <a:t> </a:t>
+            </a:r>
+            <a:r>
+              <a:rPr dirty="0" err="1"/>
+              <a:t>nei</a:t>
+            </a:r>
+            <a:r>
+              <a:rPr dirty="0"/>
+              <a:t> </a:t>
+            </a:r>
+            <a:r>
+              <a:rPr dirty="0" err="1"/>
+              <a:t>videogiochi</a:t>
+            </a:r>
+            <a:endParaRPr dirty="0"/>
           </a:p>
         </p:txBody>
       </p:sp>
@@ -14336,7 +14335,7 @@
           <a:p>
             <a:r>
               <a:rPr lang="it-IT" dirty="0"/>
-              <a:t>Agenda</a:t>
+              <a:t>Agenda - Informatica: cos'è, storia e prospettive</a:t>
             </a:r>
           </a:p>
         </p:txBody>
@@ -14368,15 +14367,6 @@
             <a:normAutofit/>
           </a:bodyPr>
           <a:lstStyle/>
-          <a:p>
-            <a:pPr marL="0" indent="0">
-              <a:buNone/>
-            </a:pPr>
-            <a:r>
-              <a:rPr lang="it-IT" dirty="0"/>
-              <a:t>Lezione 01: Informatica: cos'è, storia e prospettive</a:t>
-            </a:r>
-          </a:p>
           <a:p>
             <a:pPr marL="0" indent="0">
               <a:buNone/>

</xml_diff>